<commit_message>
finish fontend ai framework foundation.
</commit_message>
<xml_diff>
--- a/021FW_Foundation/01.introduction.pptx
+++ b/021FW_Foundation/01.introduction.pptx
@@ -381,7 +381,7 @@
               <a:pPr>
                 <a:defRPr/>
               </a:pPr>
-              <a:t>2022/10/4</a:t>
+              <a:t>2023/7/10</a:t>
             </a:fld>
             <a:endParaRPr lang="en-US" altLang="zh-CN"/>
           </a:p>
@@ -634,7 +634,7 @@
             <a:fld id="{C45443A1-D8F2-48CD-A659-3CEDBA8DF541}" type="datetimeFigureOut">
               <a:rPr lang="zh-CN" altLang="en-US" smtClean="0"/>
               <a:pPr/>
-              <a:t>2022/10/4</a:t>
+              <a:t>2023/7/10</a:t>
             </a:fld>
             <a:endParaRPr lang="zh-CN" altLang="en-US"/>
           </a:p>
@@ -17554,7 +17554,7 @@
         </p:spPr>
         <p:txBody>
           <a:bodyPr>
-            <a:normAutofit fontScale="90000"/>
+            <a:normAutofit/>
           </a:bodyPr>
           <a:lstStyle/>
           <a:p>
@@ -17564,18 +17564,22 @@
               </a:lnSpc>
             </a:pPr>
             <a:r>
-              <a:rPr lang="en-US" altLang="zh-CN" sz="12000" dirty="0">
-                <a:solidFill>
-                  <a:schemeClr val="tx1"/>
-                </a:solidFill>
+              <a:rPr lang="en-US" altLang="zh-CN" sz="9600" dirty="0">
+                <a:solidFill>
+                  <a:srgbClr val="384056"/>
+                </a:solidFill>
+                <a:latin typeface="Futura Medium" panose="020B0602020204020303" pitchFamily="34" charset="-79"/>
+                <a:cs typeface="Futura Medium" panose="020B0602020204020303" pitchFamily="34" charset="-79"/>
               </a:rPr>
               <a:t>AI</a:t>
             </a:r>
             <a:r>
-              <a:rPr lang="zh-CN" altLang="en-US" sz="12000" dirty="0">
-                <a:solidFill>
-                  <a:schemeClr val="tx1"/>
-                </a:solidFill>
+              <a:rPr lang="zh-CN" altLang="en-US" sz="9600" dirty="0">
+                <a:solidFill>
+                  <a:srgbClr val="384056"/>
+                </a:solidFill>
+                <a:latin typeface="Futura Medium" panose="020B0602020204020303" pitchFamily="34" charset="-79"/>
+                <a:cs typeface="Futura Medium" panose="020B0602020204020303" pitchFamily="34" charset="-79"/>
               </a:rPr>
               <a:t>框架基础</a:t>
             </a:r>
@@ -17616,18 +17620,22 @@
             <a:r>
               <a:rPr lang="en-US" altLang="zh-CN" sz="4400" b="1" dirty="0">
                 <a:solidFill>
-                  <a:schemeClr val="tx1"/>
-                </a:solidFill>
+                  <a:srgbClr val="384056"/>
+                </a:solidFill>
+                <a:latin typeface="Futura Medium" panose="020B0602020204020303" pitchFamily="34" charset="-79"/>
+                <a:cs typeface="Futura Medium" panose="020B0602020204020303" pitchFamily="34" charset="-79"/>
               </a:rPr>
               <a:t>ZOMI</a:t>
             </a:r>
             <a:r>
               <a:rPr lang="zh-CN" altLang="en-US" sz="4400" b="1" dirty="0">
                 <a:solidFill>
-                  <a:schemeClr val="tx1"/>
-                </a:solidFill>
+                  <a:srgbClr val="384056"/>
+                </a:solidFill>
+                <a:latin typeface="Futura Medium" panose="020B0602020204020303" pitchFamily="34" charset="-79"/>
+                <a:cs typeface="Futura Medium" panose="020B0602020204020303" pitchFamily="34" charset="-79"/>
               </a:rPr>
-              <a:t> 酱</a:t>
+              <a:t> </a:t>
             </a:r>
           </a:p>
         </p:txBody>
@@ -17899,12 +17907,19 @@
           <a:p>
             <a:r>
               <a:rPr lang="zh-CN" altLang="en-US" dirty="0">
+                <a:solidFill>
+                  <a:srgbClr val="FFC000"/>
+                </a:solidFill>
                 <a:latin typeface="+mj-ea"/>
                 <a:sym typeface="Huawei Sans" panose="020C0503030203020204" pitchFamily="34" charset="0"/>
               </a:rPr>
               <a:t>关于本内容</a:t>
             </a:r>
-            <a:endParaRPr kumimoji="1" lang="zh-CN" altLang="en-US" dirty="0"/>
+            <a:endParaRPr kumimoji="1" lang="zh-CN" altLang="en-US" dirty="0">
+              <a:solidFill>
+                <a:srgbClr val="FFC000"/>
+              </a:solidFill>
+            </a:endParaRPr>
           </a:p>
         </p:txBody>
       </p:sp>
@@ -18145,6 +18160,7 @@
                 <a:solidFill>
                   <a:srgbClr val="34393C"/>
                 </a:solidFill>
+                <a:latin typeface="Gill Sans MT" panose="020B0502020104020203" pitchFamily="34" charset="0"/>
               </a:rPr>
               <a:t>内容背景</a:t>
             </a:r>
@@ -18152,6 +18168,7 @@
               <a:solidFill>
                 <a:srgbClr val="34393C"/>
               </a:solidFill>
+              <a:latin typeface="Gill Sans MT" panose="020B0502020104020203" pitchFamily="34" charset="0"/>
             </a:endParaRPr>
           </a:p>
           <a:p>
@@ -18164,6 +18181,7 @@
                 <a:solidFill>
                   <a:srgbClr val="384056"/>
                 </a:solidFill>
+                <a:latin typeface="Gill Sans MT" panose="020B0502020104020203" pitchFamily="34" charset="0"/>
               </a:rPr>
               <a:t>AI</a:t>
             </a:r>
@@ -18172,6 +18190,7 @@
                 <a:solidFill>
                   <a:srgbClr val="384056"/>
                 </a:solidFill>
+                <a:latin typeface="Gill Sans MT" panose="020B0502020104020203" pitchFamily="34" charset="0"/>
               </a:rPr>
               <a:t>框架的基础介绍</a:t>
             </a:r>
@@ -18186,6 +18205,7 @@
                 <a:solidFill>
                   <a:srgbClr val="34393C"/>
                 </a:solidFill>
+                <a:latin typeface="Gill Sans MT" panose="020B0502020104020203" pitchFamily="34" charset="0"/>
               </a:rPr>
               <a:t>具体内容</a:t>
             </a:r>
@@ -18197,6 +18217,7 @@
                 <a:solidFill>
                   <a:srgbClr val="384056"/>
                 </a:solidFill>
+                <a:latin typeface="Gill Sans MT" panose="020B0502020104020203" pitchFamily="34" charset="0"/>
               </a:rPr>
               <a:t>AI</a:t>
             </a:r>
@@ -18205,6 +18226,7 @@
                 <a:solidFill>
                   <a:srgbClr val="384056"/>
                 </a:solidFill>
+                <a:latin typeface="Gill Sans MT" panose="020B0502020104020203" pitchFamily="34" charset="0"/>
               </a:rPr>
               <a:t>框架作用：深度学习基础 </a:t>
             </a:r>
@@ -18213,6 +18235,7 @@
                 <a:solidFill>
                   <a:srgbClr val="384056"/>
                 </a:solidFill>
+                <a:latin typeface="Gill Sans MT" panose="020B0502020104020203" pitchFamily="34" charset="0"/>
               </a:rPr>
               <a:t>–</a:t>
             </a:r>
@@ -18221,6 +18244,7 @@
                 <a:solidFill>
                   <a:srgbClr val="384056"/>
                 </a:solidFill>
+                <a:latin typeface="Gill Sans MT" panose="020B0502020104020203" pitchFamily="34" charset="0"/>
               </a:rPr>
               <a:t> </a:t>
             </a:r>
@@ -18229,6 +18253,7 @@
                 <a:solidFill>
                   <a:srgbClr val="384056"/>
                 </a:solidFill>
+                <a:latin typeface="Gill Sans MT" panose="020B0502020104020203" pitchFamily="34" charset="0"/>
               </a:rPr>
               <a:t>AI</a:t>
             </a:r>
@@ -18237,6 +18262,7 @@
                 <a:solidFill>
                   <a:srgbClr val="384056"/>
                 </a:solidFill>
+                <a:latin typeface="Gill Sans MT" panose="020B0502020104020203" pitchFamily="34" charset="0"/>
               </a:rPr>
               <a:t>框架的作用 </a:t>
             </a:r>
@@ -18245,6 +18271,7 @@
                 <a:solidFill>
                   <a:srgbClr val="384056"/>
                 </a:solidFill>
+                <a:latin typeface="Gill Sans MT" panose="020B0502020104020203" pitchFamily="34" charset="0"/>
               </a:rPr>
               <a:t>-</a:t>
             </a:r>
@@ -18253,6 +18280,7 @@
                 <a:solidFill>
                   <a:srgbClr val="384056"/>
                 </a:solidFill>
+                <a:latin typeface="Gill Sans MT" panose="020B0502020104020203" pitchFamily="34" charset="0"/>
               </a:rPr>
               <a:t>  </a:t>
             </a:r>
@@ -18261,6 +18289,7 @@
                 <a:solidFill>
                   <a:srgbClr val="384056"/>
                 </a:solidFill>
+                <a:latin typeface="Gill Sans MT" panose="020B0502020104020203" pitchFamily="34" charset="0"/>
               </a:rPr>
               <a:t>AI</a:t>
             </a:r>
@@ -18269,6 +18298,7 @@
                 <a:solidFill>
                   <a:srgbClr val="384056"/>
                 </a:solidFill>
+                <a:latin typeface="Gill Sans MT" panose="020B0502020104020203" pitchFamily="34" charset="0"/>
               </a:rPr>
               <a:t>框架的目的</a:t>
             </a:r>
@@ -18276,6 +18306,7 @@
               <a:solidFill>
                 <a:srgbClr val="384056"/>
               </a:solidFill>
+              <a:latin typeface="Gill Sans MT" panose="020B0502020104020203" pitchFamily="34" charset="0"/>
             </a:endParaRPr>
           </a:p>
           <a:p>
@@ -18285,6 +18316,7 @@
                 <a:solidFill>
                   <a:srgbClr val="384056"/>
                 </a:solidFill>
+                <a:latin typeface="Gill Sans MT" panose="020B0502020104020203" pitchFamily="34" charset="0"/>
               </a:rPr>
               <a:t>AI</a:t>
             </a:r>
@@ -18293,6 +18325,7 @@
                 <a:solidFill>
                   <a:srgbClr val="384056"/>
                 </a:solidFill>
+                <a:latin typeface="Gill Sans MT" panose="020B0502020104020203" pitchFamily="34" charset="0"/>
               </a:rPr>
               <a:t>框架之争：第一代框架 </a:t>
             </a:r>
@@ -18301,6 +18334,7 @@
                 <a:solidFill>
                   <a:srgbClr val="384056"/>
                 </a:solidFill>
+                <a:latin typeface="Gill Sans MT" panose="020B0502020104020203" pitchFamily="34" charset="0"/>
               </a:rPr>
               <a:t>–</a:t>
             </a:r>
@@ -18309,6 +18343,7 @@
                 <a:solidFill>
                   <a:srgbClr val="384056"/>
                 </a:solidFill>
+                <a:latin typeface="Gill Sans MT" panose="020B0502020104020203" pitchFamily="34" charset="0"/>
               </a:rPr>
               <a:t> 第二代框架 </a:t>
             </a:r>
@@ -18317,6 +18352,7 @@
                 <a:solidFill>
                   <a:srgbClr val="384056"/>
                 </a:solidFill>
+                <a:latin typeface="Gill Sans MT" panose="020B0502020104020203" pitchFamily="34" charset="0"/>
               </a:rPr>
               <a:t>–</a:t>
             </a:r>
@@ -18325,6 +18361,7 @@
                 <a:solidFill>
                   <a:srgbClr val="384056"/>
                 </a:solidFill>
+                <a:latin typeface="Gill Sans MT" panose="020B0502020104020203" pitchFamily="34" charset="0"/>
               </a:rPr>
               <a:t> 第三代框架</a:t>
             </a:r>
@@ -18332,6 +18369,7 @@
               <a:solidFill>
                 <a:srgbClr val="384056"/>
               </a:solidFill>
+              <a:latin typeface="Gill Sans MT" panose="020B0502020104020203" pitchFamily="34" charset="0"/>
             </a:endParaRPr>
           </a:p>
           <a:p>
@@ -18341,6 +18379,7 @@
                 <a:solidFill>
                   <a:srgbClr val="384056"/>
                 </a:solidFill>
+                <a:latin typeface="Gill Sans MT" panose="020B0502020104020203" pitchFamily="34" charset="0"/>
               </a:rPr>
               <a:t>编程范式：声明式编程 </a:t>
             </a:r>
@@ -18349,6 +18388,7 @@
                 <a:solidFill>
                   <a:srgbClr val="384056"/>
                 </a:solidFill>
+                <a:latin typeface="Gill Sans MT" panose="020B0502020104020203" pitchFamily="34" charset="0"/>
               </a:rPr>
               <a:t>-</a:t>
             </a:r>
@@ -18357,6 +18397,7 @@
                 <a:solidFill>
                   <a:srgbClr val="384056"/>
                 </a:solidFill>
+                <a:latin typeface="Gill Sans MT" panose="020B0502020104020203" pitchFamily="34" charset="0"/>
               </a:rPr>
               <a:t> 命令式编程</a:t>
             </a:r>
@@ -18424,6 +18465,9 @@
           <a:p>
             <a:r>
               <a:rPr lang="zh-CN" altLang="en-US" dirty="0">
+                <a:solidFill>
+                  <a:srgbClr val="C00000"/>
+                </a:solidFill>
                 <a:latin typeface="+mj-ea"/>
                 <a:sym typeface="Huawei Sans" panose="020C0503030203020204" pitchFamily="34" charset="0"/>
               </a:rPr>
@@ -18431,6 +18475,9 @@
             </a:r>
             <a:r>
               <a:rPr lang="zh-CN" altLang="en-US" dirty="0">
+                <a:solidFill>
+                  <a:srgbClr val="C00000"/>
+                </a:solidFill>
                 <a:latin typeface="+mj-ea"/>
                 <a:cs typeface="Arial" panose="020B0604020202020204" pitchFamily="34" charset="0"/>
                 <a:sym typeface="Huawei Sans" panose="020C0503030203020204" pitchFamily="34" charset="0"/>
@@ -18438,6 +18485,9 @@
               <a:t>目标</a:t>
             </a:r>
             <a:endParaRPr lang="zh-CN" altLang="en-US" dirty="0">
+              <a:solidFill>
+                <a:srgbClr val="C00000"/>
+              </a:solidFill>
               <a:latin typeface="+mj-ea"/>
             </a:endParaRPr>
           </a:p>
@@ -18477,6 +18527,7 @@
                 <a:solidFill>
                   <a:srgbClr val="34393C"/>
                 </a:solidFill>
+                <a:latin typeface="Gill Sans MT" panose="020B0502020104020203" pitchFamily="34" charset="0"/>
               </a:rPr>
               <a:t>了解完本内容后，您将能够：</a:t>
             </a:r>
@@ -18484,6 +18535,7 @@
               <a:solidFill>
                 <a:srgbClr val="34393C"/>
               </a:solidFill>
+              <a:latin typeface="Gill Sans MT" panose="020B0502020104020203" pitchFamily="34" charset="0"/>
             </a:endParaRPr>
           </a:p>
           <a:p>
@@ -18496,6 +18548,7 @@
                 <a:solidFill>
                   <a:srgbClr val="34393C"/>
                 </a:solidFill>
+                <a:latin typeface="Gill Sans MT" panose="020B0502020104020203" pitchFamily="34" charset="0"/>
               </a:rPr>
               <a:t>了解友商质疑我们自己捣鼓</a:t>
             </a:r>
@@ -18504,6 +18557,7 @@
                 <a:solidFill>
                   <a:srgbClr val="34393C"/>
                 </a:solidFill>
+                <a:latin typeface="Gill Sans MT" panose="020B0502020104020203" pitchFamily="34" charset="0"/>
               </a:rPr>
               <a:t>AI</a:t>
             </a:r>
@@ -18512,6 +18566,7 @@
                 <a:solidFill>
                   <a:srgbClr val="34393C"/>
                 </a:solidFill>
+                <a:latin typeface="Gill Sans MT" panose="020B0502020104020203" pitchFamily="34" charset="0"/>
               </a:rPr>
               <a:t>框架的意义和</a:t>
             </a:r>
@@ -18520,6 +18575,7 @@
                 <a:solidFill>
                   <a:srgbClr val="34393C"/>
                 </a:solidFill>
+                <a:latin typeface="Gill Sans MT" panose="020B0502020104020203" pitchFamily="34" charset="0"/>
               </a:rPr>
               <a:t>AI</a:t>
             </a:r>
@@ -18528,6 +18584,7 @@
                 <a:solidFill>
                   <a:srgbClr val="34393C"/>
                 </a:solidFill>
+                <a:latin typeface="Gill Sans MT" panose="020B0502020104020203" pitchFamily="34" charset="0"/>
               </a:rPr>
               <a:t>框架具体作用</a:t>
             </a:r>
@@ -18542,6 +18599,7 @@
                 <a:solidFill>
                   <a:srgbClr val="34393C"/>
                 </a:solidFill>
+                <a:latin typeface="Gill Sans MT" panose="020B0502020104020203" pitchFamily="34" charset="0"/>
               </a:rPr>
               <a:t>了解到</a:t>
             </a:r>
@@ -18550,6 +18608,7 @@
                 <a:solidFill>
                   <a:srgbClr val="34393C"/>
                 </a:solidFill>
+                <a:latin typeface="Gill Sans MT" panose="020B0502020104020203" pitchFamily="34" charset="0"/>
               </a:rPr>
               <a:t>AI</a:t>
             </a:r>
@@ -18558,6 +18617,7 @@
                 <a:solidFill>
                   <a:srgbClr val="34393C"/>
                 </a:solidFill>
+                <a:latin typeface="Gill Sans MT" panose="020B0502020104020203" pitchFamily="34" charset="0"/>
               </a:rPr>
               <a:t>框架框架的发展历史和技术带给行业的</a:t>
             </a:r>
@@ -18566,6 +18626,7 @@
                 <a:solidFill>
                   <a:srgbClr val="34393C"/>
                 </a:solidFill>
+                <a:latin typeface="Gill Sans MT" panose="020B0502020104020203" pitchFamily="34" charset="0"/>
               </a:rPr>
               <a:t>AI</a:t>
             </a:r>
@@ -18574,6 +18635,7 @@
                 <a:solidFill>
                   <a:srgbClr val="34393C"/>
                 </a:solidFill>
+                <a:latin typeface="Gill Sans MT" panose="020B0502020104020203" pitchFamily="34" charset="0"/>
               </a:rPr>
               <a:t>快乐</a:t>
             </a:r>
@@ -18581,6 +18643,7 @@
               <a:solidFill>
                 <a:srgbClr val="34393C"/>
               </a:solidFill>
+              <a:latin typeface="Gill Sans MT" panose="020B0502020104020203" pitchFamily="34" charset="0"/>
             </a:endParaRPr>
           </a:p>
           <a:p>
@@ -18593,6 +18656,7 @@
                 <a:solidFill>
                   <a:srgbClr val="34393C"/>
                 </a:solidFill>
+                <a:latin typeface="Gill Sans MT" panose="020B0502020104020203" pitchFamily="34" charset="0"/>
               </a:rPr>
               <a:t>了解了程序员天天为之吵架的编程范式</a:t>
             </a:r>
@@ -18600,6 +18664,7 @@
               <a:solidFill>
                 <a:srgbClr val="34393C"/>
               </a:solidFill>
+              <a:latin typeface="Gill Sans MT" panose="020B0502020104020203" pitchFamily="34" charset="0"/>
             </a:endParaRPr>
           </a:p>
         </p:txBody>

</xml_diff>